<commit_message>
Added the demo file
</commit_message>
<xml_diff>
--- a/Hadoop Webinar - Session 3 (Hadoop Map Reduce - Concepts & Hands On).pptx
+++ b/Hadoop Webinar - Session 3 (Hadoop Map Reduce - Concepts & Hands On).pptx
@@ -5,7 +5,7 @@
     <p:sldMasterId id="2147483648" r:id="rId1"/>
   </p:sldMasterIdLst>
   <p:notesMasterIdLst>
-    <p:notesMasterId r:id="rId10"/>
+    <p:notesMasterId r:id="rId11"/>
   </p:notesMasterIdLst>
   <p:sldIdLst>
     <p:sldId id="256" r:id="rId2"/>
@@ -15,7 +15,8 @@
     <p:sldId id="275" r:id="rId6"/>
     <p:sldId id="280" r:id="rId7"/>
     <p:sldId id="281" r:id="rId8"/>
-    <p:sldId id="279" r:id="rId9"/>
+    <p:sldId id="282" r:id="rId9"/>
+    <p:sldId id="279" r:id="rId10"/>
   </p:sldIdLst>
   <p:sldSz cx="9144000" cy="6858000" type="screen4x3"/>
   <p:notesSz cx="6858000" cy="9144000"/>
@@ -4296,6 +4297,106 @@
 </file>
 
 <file path=ppt/slides/slide8.xml><?xml version="1.0" encoding="utf-8"?>
+<p:sld xmlns:a="http://schemas.openxmlformats.org/drawingml/2006/main" xmlns:r="http://schemas.openxmlformats.org/officeDocument/2006/relationships" xmlns:p="http://schemas.openxmlformats.org/presentationml/2006/main">
+  <p:cSld>
+    <p:spTree>
+      <p:nvGrpSpPr>
+        <p:cNvPr id="1" name=""/>
+        <p:cNvGrpSpPr/>
+        <p:nvPr/>
+      </p:nvGrpSpPr>
+      <p:grpSpPr>
+        <a:xfrm>
+          <a:off x="0" y="0"/>
+          <a:ext cx="0" cy="0"/>
+          <a:chOff x="0" y="0"/>
+          <a:chExt cx="0" cy="0"/>
+        </a:xfrm>
+      </p:grpSpPr>
+      <p:sp>
+        <p:nvSpPr>
+          <p:cNvPr id="2" name="Title 1"/>
+          <p:cNvSpPr>
+            <a:spLocks noGrp="1"/>
+          </p:cNvSpPr>
+          <p:nvPr>
+            <p:ph type="title"/>
+          </p:nvPr>
+        </p:nvSpPr>
+        <p:spPr/>
+        <p:txBody>
+          <a:bodyPr/>
+          <a:lstStyle/>
+          <a:p>
+            <a:r>
+              <a:rPr lang="en-IN" dirty="0" smtClean="0">
+                <a:solidFill>
+                  <a:srgbClr val="008000"/>
+                </a:solidFill>
+              </a:rPr>
+              <a:t>Map Reduce </a:t>
+            </a:r>
+            <a:r>
+              <a:rPr lang="en-IN" smtClean="0">
+                <a:solidFill>
+                  <a:srgbClr val="008000"/>
+                </a:solidFill>
+              </a:rPr>
+              <a:t>– Partitioners</a:t>
+            </a:r>
+            <a:endParaRPr lang="en-IN" dirty="0">
+              <a:solidFill>
+                <a:srgbClr val="008000"/>
+              </a:solidFill>
+            </a:endParaRPr>
+          </a:p>
+        </p:txBody>
+      </p:sp>
+      <p:pic>
+        <p:nvPicPr>
+          <p:cNvPr id="4" name="Picture 3"/>
+          <p:cNvPicPr>
+            <a:picLocks noChangeAspect="1"/>
+          </p:cNvPicPr>
+          <p:nvPr/>
+        </p:nvPicPr>
+        <p:blipFill>
+          <a:blip r:embed="rId2"/>
+          <a:stretch>
+            <a:fillRect/>
+          </a:stretch>
+        </p:blipFill>
+        <p:spPr>
+          <a:xfrm>
+            <a:off x="323528" y="1124744"/>
+            <a:ext cx="8640960" cy="4916680"/>
+          </a:xfrm>
+          <a:prstGeom prst="rect">
+            <a:avLst/>
+          </a:prstGeom>
+        </p:spPr>
+      </p:pic>
+    </p:spTree>
+    <p:extLst>
+      <p:ext uri="{BB962C8B-B14F-4D97-AF65-F5344CB8AC3E}">
+        <p14:creationId xmlns:p14="http://schemas.microsoft.com/office/powerpoint/2010/main" val="239420193"/>
+      </p:ext>
+    </p:extLst>
+  </p:cSld>
+  <p:clrMapOvr>
+    <a:masterClrMapping/>
+  </p:clrMapOvr>
+  <p:timing>
+    <p:tnLst>
+      <p:par>
+        <p:cTn xmlns:p14="http://schemas.microsoft.com/office/powerpoint/2010/main" id="1" dur="indefinite" restart="never" nodeType="tmRoot"/>
+      </p:par>
+    </p:tnLst>
+  </p:timing>
+</p:sld>
+</file>
+
+<file path=ppt/slides/slide9.xml><?xml version="1.0" encoding="utf-8"?>
 <p:sld xmlns:a="http://schemas.openxmlformats.org/drawingml/2006/main" xmlns:r="http://schemas.openxmlformats.org/officeDocument/2006/relationships" xmlns:p="http://schemas.openxmlformats.org/presentationml/2006/main">
   <p:cSld>
     <p:spTree>

</xml_diff>